<commit_message>
Add xml files and update documents.
</commit_message>
<xml_diff>
--- a/CPSC-24500/Week08/2017SpringW08Slides.pptx
+++ b/CPSC-24500/Week08/2017SpringW08Slides.pptx
@@ -8577,7 +8577,7 @@
             </a:pPr>
             <a:r>
               <a:rPr lang="en-US" sz="2000" dirty="0"/>
-              <a:t>Review .NET (C#) framework as it relates to database usage and architectural decisions</a:t>
+              <a:t>Introduce network programming concepts </a:t>
             </a:r>
           </a:p>
           <a:p>
@@ -8587,7 +8587,7 @@
             </a:pPr>
             <a:r>
               <a:rPr lang="en-US" sz="2000" dirty="0"/>
-              <a:t>Introduce network programming concepts </a:t>
+              <a:t>Understand Web Services network programming</a:t>
             </a:r>
           </a:p>
           <a:p>
@@ -8597,17 +8597,7 @@
             </a:pPr>
             <a:r>
               <a:rPr lang="en-US" sz="2000" dirty="0"/>
-              <a:t>Understand Web Services network programming</a:t>
-            </a:r>
-          </a:p>
-          <a:p>
-            <a:pPr marL="457200" indent="-457200">
-              <a:buFont typeface="+mj-lt"/>
-              <a:buAutoNum type="arabicPeriod"/>
-            </a:pPr>
-            <a:r>
-              <a:rPr lang="en-US" sz="2000" dirty="0"/>
-              <a:t>Develop a middle-tier interactive server using network programming and Web Services</a:t>
+              <a:t>Develop a middle-tier data server using network programming</a:t>
             </a:r>
           </a:p>
         </p:txBody>
@@ -9622,7 +9612,7 @@
             </a:pPr>
             <a:r>
               <a:rPr lang="en-US" sz="2000" dirty="0"/>
-              <a:t>Review .NET (C#) framework as it relates to database usage and architectural decisions</a:t>
+              <a:t>Introduce network programming concepts </a:t>
             </a:r>
           </a:p>
           <a:p>
@@ -9632,7 +9622,7 @@
             </a:pPr>
             <a:r>
               <a:rPr lang="en-US" sz="2000" dirty="0"/>
-              <a:t>Introduce network programming concepts </a:t>
+              <a:t>Understand Web Services network programming</a:t>
             </a:r>
           </a:p>
           <a:p>
@@ -9642,17 +9632,7 @@
             </a:pPr>
             <a:r>
               <a:rPr lang="en-US" sz="2000" dirty="0"/>
-              <a:t>Understand Web Services network programming</a:t>
-            </a:r>
-          </a:p>
-          <a:p>
-            <a:pPr marL="457200" indent="-457200">
-              <a:buFont typeface="+mj-lt"/>
-              <a:buAutoNum type="arabicPeriod"/>
-            </a:pPr>
-            <a:r>
-              <a:rPr lang="en-US" sz="2000" dirty="0"/>
-              <a:t>Develop a middle-tier interactive server using network programming and Web Services</a:t>
+              <a:t>Develop a middle-tier data server using network programming</a:t>
             </a:r>
           </a:p>
         </p:txBody>
@@ -13410,7 +13390,7 @@
             </a:pPr>
             <a:r>
               <a:rPr lang="en-US" sz="2000" dirty="0"/>
-              <a:t>Review .NET (C#) framework as it relates to database usage and architectural decisions</a:t>
+              <a:t>Introduce network programming concepts </a:t>
             </a:r>
           </a:p>
           <a:p>
@@ -13420,7 +13400,7 @@
             </a:pPr>
             <a:r>
               <a:rPr lang="en-US" sz="2000" dirty="0"/>
-              <a:t>Introduce network programming concepts </a:t>
+              <a:t>Understand Web Services network programming</a:t>
             </a:r>
           </a:p>
           <a:p>
@@ -13430,17 +13410,7 @@
             </a:pPr>
             <a:r>
               <a:rPr lang="en-US" sz="2000" dirty="0"/>
-              <a:t>Understand Web Services network programming</a:t>
-            </a:r>
-          </a:p>
-          <a:p>
-            <a:pPr marL="457200" indent="-457200">
-              <a:buFont typeface="+mj-lt"/>
-              <a:buAutoNum type="arabicPeriod"/>
-            </a:pPr>
-            <a:r>
-              <a:rPr lang="en-US" sz="2000" dirty="0"/>
-              <a:t>Develop a middle-tier interactive server using network programming and Web Services</a:t>
+              <a:t>Develop a middle-tier data server using network programming</a:t>
             </a:r>
           </a:p>
         </p:txBody>
@@ -15571,13 +15541,13 @@
 <file path=customXml/itemProps3.xml><?xml version="1.0" encoding="utf-8"?>
 <ds:datastoreItem xmlns:ds="http://schemas.openxmlformats.org/officeDocument/2006/customXml" ds:itemID="{3473EA1A-2744-48E8-B2A3-4F89C0FC849C}">
   <ds:schemaRefs>
+    <ds:schemaRef ds:uri="http://schemas.microsoft.com/office/2006/documentManagement/types"/>
+    <ds:schemaRef ds:uri="http://purl.org/dc/elements/1.1/"/>
+    <ds:schemaRef ds:uri="http://schemas.microsoft.com/office/2006/metadata/properties"/>
     <ds:schemaRef ds:uri="http://purl.org/dc/terms/"/>
     <ds:schemaRef ds:uri="http://schemas.openxmlformats.org/package/2006/metadata/core-properties"/>
     <ds:schemaRef ds:uri="http://purl.org/dc/dcmitype/"/>
     <ds:schemaRef ds:uri="http://schemas.microsoft.com/office/infopath/2007/PartnerControls"/>
-    <ds:schemaRef ds:uri="http://schemas.microsoft.com/office/2006/documentManagement/types"/>
-    <ds:schemaRef ds:uri="http://purl.org/dc/elements/1.1/"/>
-    <ds:schemaRef ds:uri="http://schemas.microsoft.com/office/2006/metadata/properties"/>
     <ds:schemaRef ds:uri="http://www.w3.org/XML/1998/namespace"/>
   </ds:schemaRefs>
 </ds:datastoreItem>

</xml_diff>

<commit_message>
Add session 4 html reference file and update slides.
</commit_message>
<xml_diff>
--- a/CPSC-24500/Week08/2017SpringW08Slides.pptx
+++ b/CPSC-24500/Week08/2017SpringW08Slides.pptx
@@ -5,7 +5,7 @@
     <p:sldMasterId id="2147483648" r:id="rId4"/>
   </p:sldMasterIdLst>
   <p:notesMasterIdLst>
-    <p:notesMasterId r:id="rId49"/>
+    <p:notesMasterId r:id="rId52"/>
   </p:notesMasterIdLst>
   <p:sldIdLst>
     <p:sldId id="381" r:id="rId5"/>
@@ -50,8 +50,11 @@
     <p:sldId id="567" r:id="rId44"/>
     <p:sldId id="569" r:id="rId45"/>
     <p:sldId id="568" r:id="rId46"/>
-    <p:sldId id="547" r:id="rId47"/>
-    <p:sldId id="551" r:id="rId48"/>
+    <p:sldId id="593" r:id="rId47"/>
+    <p:sldId id="595" r:id="rId48"/>
+    <p:sldId id="594" r:id="rId49"/>
+    <p:sldId id="547" r:id="rId50"/>
+    <p:sldId id="551" r:id="rId51"/>
   </p:sldIdLst>
   <p:sldSz cx="12192000" cy="6858000"/>
   <p:notesSz cx="7315200" cy="9601200"/>
@@ -4551,6 +4554,12 @@
           <a:bodyPr/>
           <a:lstStyle/>
           <a:p>
+            <a:r>
+              <a:rPr lang="en-US" sz="1000" dirty="0"/>
+              <a:t>We are reviewing this so that we can relate it back to databases and client-server development.</a:t>
+            </a:r>
+          </a:p>
+          <a:p>
             <a:endParaRPr lang="en-US" sz="1000" dirty="0"/>
           </a:p>
         </p:txBody>
@@ -4581,7 +4590,7 @@
     </p:spTree>
     <p:extLst>
       <p:ext uri="{BB962C8B-B14F-4D97-AF65-F5344CB8AC3E}">
-        <p14:creationId xmlns:p14="http://schemas.microsoft.com/office/powerpoint/2010/main" val="2081081894"/>
+        <p14:creationId xmlns:p14="http://schemas.microsoft.com/office/powerpoint/2010/main" val="166182486"/>
       </p:ext>
     </p:extLst>
   </p:cSld>
@@ -4635,6 +4644,7 @@
           <a:bodyPr/>
           <a:lstStyle/>
           <a:p>
+            <a:pPr lvl="0"/>
             <a:endParaRPr lang="en-US" sz="1000" dirty="0"/>
           </a:p>
         </p:txBody>
@@ -4657,6 +4667,258 @@
             <a:fld id="{5394DE12-7B9B-46AA-AC19-C30A49928B9B}" type="slidenum">
               <a:rPr lang="en-US" smtClean="0"/>
               <a:t>44</a:t>
+            </a:fld>
+            <a:endParaRPr lang="en-US" dirty="0"/>
+          </a:p>
+        </p:txBody>
+      </p:sp>
+    </p:spTree>
+    <p:extLst>
+      <p:ext uri="{BB962C8B-B14F-4D97-AF65-F5344CB8AC3E}">
+        <p14:creationId xmlns:p14="http://schemas.microsoft.com/office/powerpoint/2010/main" val="3760054081"/>
+      </p:ext>
+    </p:extLst>
+  </p:cSld>
+  <p:clrMapOvr>
+    <a:masterClrMapping/>
+  </p:clrMapOvr>
+</p:notes>
+</file>
+
+<file path=ppt/notesSlides/notesSlide45.xml><?xml version="1.0" encoding="utf-8"?>
+<p:notes xmlns:a="http://schemas.openxmlformats.org/drawingml/2006/main" xmlns:r="http://schemas.openxmlformats.org/officeDocument/2006/relationships" xmlns:p="http://schemas.openxmlformats.org/presentationml/2006/main">
+  <p:cSld>
+    <p:spTree>
+      <p:nvGrpSpPr>
+        <p:cNvPr id="1" name=""/>
+        <p:cNvGrpSpPr/>
+        <p:nvPr/>
+      </p:nvGrpSpPr>
+      <p:grpSpPr>
+        <a:xfrm>
+          <a:off x="0" y="0"/>
+          <a:ext cx="0" cy="0"/>
+          <a:chOff x="0" y="0"/>
+          <a:chExt cx="0" cy="0"/>
+        </a:xfrm>
+      </p:grpSpPr>
+      <p:sp>
+        <p:nvSpPr>
+          <p:cNvPr id="2" name="Slide Image Placeholder 1"/>
+          <p:cNvSpPr>
+            <a:spLocks noGrp="1" noRot="1" noChangeAspect="1"/>
+          </p:cNvSpPr>
+          <p:nvPr>
+            <p:ph type="sldImg"/>
+          </p:nvPr>
+        </p:nvSpPr>
+        <p:spPr/>
+      </p:sp>
+      <p:sp>
+        <p:nvSpPr>
+          <p:cNvPr id="3" name="Notes Placeholder 2"/>
+          <p:cNvSpPr>
+            <a:spLocks noGrp="1"/>
+          </p:cNvSpPr>
+          <p:nvPr>
+            <p:ph type="body" idx="1"/>
+          </p:nvPr>
+        </p:nvSpPr>
+        <p:spPr/>
+        <p:txBody>
+          <a:bodyPr/>
+          <a:lstStyle/>
+          <a:p>
+            <a:endParaRPr lang="en-US" sz="1000" dirty="0"/>
+          </a:p>
+        </p:txBody>
+      </p:sp>
+      <p:sp>
+        <p:nvSpPr>
+          <p:cNvPr id="4" name="Slide Number Placeholder 3"/>
+          <p:cNvSpPr>
+            <a:spLocks noGrp="1"/>
+          </p:cNvSpPr>
+          <p:nvPr>
+            <p:ph type="sldNum" sz="quarter" idx="10"/>
+          </p:nvPr>
+        </p:nvSpPr>
+        <p:spPr/>
+        <p:txBody>
+          <a:bodyPr/>
+          <a:lstStyle/>
+          <a:p>
+            <a:fld id="{5394DE12-7B9B-46AA-AC19-C30A49928B9B}" type="slidenum">
+              <a:rPr lang="en-US" smtClean="0"/>
+              <a:t>45</a:t>
+            </a:fld>
+            <a:endParaRPr lang="en-US" dirty="0"/>
+          </a:p>
+        </p:txBody>
+      </p:sp>
+    </p:spTree>
+    <p:extLst>
+      <p:ext uri="{BB962C8B-B14F-4D97-AF65-F5344CB8AC3E}">
+        <p14:creationId xmlns:p14="http://schemas.microsoft.com/office/powerpoint/2010/main" val="4194078173"/>
+      </p:ext>
+    </p:extLst>
+  </p:cSld>
+  <p:clrMapOvr>
+    <a:masterClrMapping/>
+  </p:clrMapOvr>
+</p:notes>
+</file>
+
+<file path=ppt/notesSlides/notesSlide46.xml><?xml version="1.0" encoding="utf-8"?>
+<p:notes xmlns:a="http://schemas.openxmlformats.org/drawingml/2006/main" xmlns:r="http://schemas.openxmlformats.org/officeDocument/2006/relationships" xmlns:p="http://schemas.openxmlformats.org/presentationml/2006/main">
+  <p:cSld>
+    <p:spTree>
+      <p:nvGrpSpPr>
+        <p:cNvPr id="1" name=""/>
+        <p:cNvGrpSpPr/>
+        <p:nvPr/>
+      </p:nvGrpSpPr>
+      <p:grpSpPr>
+        <a:xfrm>
+          <a:off x="0" y="0"/>
+          <a:ext cx="0" cy="0"/>
+          <a:chOff x="0" y="0"/>
+          <a:chExt cx="0" cy="0"/>
+        </a:xfrm>
+      </p:grpSpPr>
+      <p:sp>
+        <p:nvSpPr>
+          <p:cNvPr id="2" name="Slide Image Placeholder 1"/>
+          <p:cNvSpPr>
+            <a:spLocks noGrp="1" noRot="1" noChangeAspect="1"/>
+          </p:cNvSpPr>
+          <p:nvPr>
+            <p:ph type="sldImg"/>
+          </p:nvPr>
+        </p:nvSpPr>
+        <p:spPr/>
+      </p:sp>
+      <p:sp>
+        <p:nvSpPr>
+          <p:cNvPr id="3" name="Notes Placeholder 2"/>
+          <p:cNvSpPr>
+            <a:spLocks noGrp="1"/>
+          </p:cNvSpPr>
+          <p:nvPr>
+            <p:ph type="body" idx="1"/>
+          </p:nvPr>
+        </p:nvSpPr>
+        <p:spPr/>
+        <p:txBody>
+          <a:bodyPr/>
+          <a:lstStyle/>
+          <a:p>
+            <a:endParaRPr lang="en-US" sz="1000" dirty="0"/>
+          </a:p>
+        </p:txBody>
+      </p:sp>
+      <p:sp>
+        <p:nvSpPr>
+          <p:cNvPr id="4" name="Slide Number Placeholder 3"/>
+          <p:cNvSpPr>
+            <a:spLocks noGrp="1"/>
+          </p:cNvSpPr>
+          <p:nvPr>
+            <p:ph type="sldNum" sz="quarter" idx="10"/>
+          </p:nvPr>
+        </p:nvSpPr>
+        <p:spPr/>
+        <p:txBody>
+          <a:bodyPr/>
+          <a:lstStyle/>
+          <a:p>
+            <a:fld id="{5394DE12-7B9B-46AA-AC19-C30A49928B9B}" type="slidenum">
+              <a:rPr lang="en-US" smtClean="0"/>
+              <a:t>46</a:t>
+            </a:fld>
+            <a:endParaRPr lang="en-US" dirty="0"/>
+          </a:p>
+        </p:txBody>
+      </p:sp>
+    </p:spTree>
+    <p:extLst>
+      <p:ext uri="{BB962C8B-B14F-4D97-AF65-F5344CB8AC3E}">
+        <p14:creationId xmlns:p14="http://schemas.microsoft.com/office/powerpoint/2010/main" val="2081081894"/>
+      </p:ext>
+    </p:extLst>
+  </p:cSld>
+  <p:clrMapOvr>
+    <a:masterClrMapping/>
+  </p:clrMapOvr>
+</p:notes>
+</file>
+
+<file path=ppt/notesSlides/notesSlide47.xml><?xml version="1.0" encoding="utf-8"?>
+<p:notes xmlns:a="http://schemas.openxmlformats.org/drawingml/2006/main" xmlns:r="http://schemas.openxmlformats.org/officeDocument/2006/relationships" xmlns:p="http://schemas.openxmlformats.org/presentationml/2006/main">
+  <p:cSld>
+    <p:spTree>
+      <p:nvGrpSpPr>
+        <p:cNvPr id="1" name=""/>
+        <p:cNvGrpSpPr/>
+        <p:nvPr/>
+      </p:nvGrpSpPr>
+      <p:grpSpPr>
+        <a:xfrm>
+          <a:off x="0" y="0"/>
+          <a:ext cx="0" cy="0"/>
+          <a:chOff x="0" y="0"/>
+          <a:chExt cx="0" cy="0"/>
+        </a:xfrm>
+      </p:grpSpPr>
+      <p:sp>
+        <p:nvSpPr>
+          <p:cNvPr id="2" name="Slide Image Placeholder 1"/>
+          <p:cNvSpPr>
+            <a:spLocks noGrp="1" noRot="1" noChangeAspect="1"/>
+          </p:cNvSpPr>
+          <p:nvPr>
+            <p:ph type="sldImg"/>
+          </p:nvPr>
+        </p:nvSpPr>
+        <p:spPr/>
+      </p:sp>
+      <p:sp>
+        <p:nvSpPr>
+          <p:cNvPr id="3" name="Notes Placeholder 2"/>
+          <p:cNvSpPr>
+            <a:spLocks noGrp="1"/>
+          </p:cNvSpPr>
+          <p:nvPr>
+            <p:ph type="body" idx="1"/>
+          </p:nvPr>
+        </p:nvSpPr>
+        <p:spPr/>
+        <p:txBody>
+          <a:bodyPr/>
+          <a:lstStyle/>
+          <a:p>
+            <a:endParaRPr lang="en-US" sz="1000" dirty="0"/>
+          </a:p>
+        </p:txBody>
+      </p:sp>
+      <p:sp>
+        <p:nvSpPr>
+          <p:cNvPr id="4" name="Slide Number Placeholder 3"/>
+          <p:cNvSpPr>
+            <a:spLocks noGrp="1"/>
+          </p:cNvSpPr>
+          <p:nvPr>
+            <p:ph type="sldNum" sz="quarter" idx="10"/>
+          </p:nvPr>
+        </p:nvSpPr>
+        <p:spPr/>
+        <p:txBody>
+          <a:bodyPr/>
+          <a:lstStyle/>
+          <a:p>
+            <a:fld id="{5394DE12-7B9B-46AA-AC19-C30A49928B9B}" type="slidenum">
+              <a:rPr lang="en-US" smtClean="0"/>
+              <a:t>47</a:t>
             </a:fld>
             <a:endParaRPr lang="en-US" dirty="0"/>
           </a:p>
@@ -23071,7 +23333,7 @@
       </p:pic>
       <p:sp>
         <p:nvSpPr>
-          <p:cNvPr id="10" name="Content Placeholder 2"/>
+          <p:cNvPr id="7" name="Content Placeholder 2"/>
           <p:cNvSpPr>
             <a:spLocks noGrp="1"/>
           </p:cNvSpPr>
@@ -23079,12 +23341,7 @@
             <p:ph idx="1"/>
           </p:nvPr>
         </p:nvSpPr>
-        <p:spPr>
-          <a:xfrm>
-            <a:off x="838200" y="1884313"/>
-            <a:ext cx="10718950" cy="4571242"/>
-          </a:xfrm>
-        </p:spPr>
+        <p:spPr/>
         <p:txBody>
           <a:bodyPr>
             <a:noAutofit/>
@@ -23095,12 +23352,8 @@
               <a:buNone/>
             </a:pPr>
             <a:r>
-              <a:rPr lang="en-US" sz="2000" u="sng" dirty="0" err="1"/>
-              <a:t>ShapeDrawDataServerStart</a:t>
-            </a:r>
-            <a:r>
               <a:rPr lang="en-US" sz="2000" u="sng" dirty="0"/>
-              <a:t> Application:</a:t>
+              <a:t>Agenda:</a:t>
             </a:r>
           </a:p>
           <a:p>
@@ -23110,7 +23363,7 @@
             </a:pPr>
             <a:r>
               <a:rPr lang="en-US" sz="2000" dirty="0"/>
-              <a:t>Develop  application entirely in Visual Studio 2017 and C#</a:t>
+              <a:t>Review Week 8 Learning Objectives</a:t>
             </a:r>
           </a:p>
           <a:p>
@@ -23120,7 +23373,15 @@
             </a:pPr>
             <a:r>
               <a:rPr lang="en-US" sz="2000" dirty="0"/>
-              <a:t>Listen for a socket request</a:t>
+              <a:t>Develop </a:t>
+            </a:r>
+            <a:r>
+              <a:rPr lang="en-US" sz="2000" dirty="0" err="1"/>
+              <a:t>ShapeDrawDataServerStart</a:t>
+            </a:r>
+            <a:r>
+              <a:rPr lang="en-US" sz="2000" dirty="0"/>
+              <a:t> Application</a:t>
             </a:r>
           </a:p>
           <a:p>
@@ -23130,7 +23391,15 @@
             </a:pPr>
             <a:r>
               <a:rPr lang="en-US" sz="2000" dirty="0"/>
-              <a:t>Echo the request back to the client</a:t>
+              <a:t>Review </a:t>
+            </a:r>
+            <a:r>
+              <a:rPr lang="en-US" sz="2000" dirty="0" err="1"/>
+              <a:t>ShapeDrawDataClient</a:t>
+            </a:r>
+            <a:r>
+              <a:rPr lang="en-US" sz="2000" dirty="0"/>
+              <a:t> Application</a:t>
             </a:r>
           </a:p>
           <a:p>
@@ -23140,14 +23409,26 @@
             </a:pPr>
             <a:r>
               <a:rPr lang="en-US" sz="2000" dirty="0"/>
-              <a:t>You may utilize this code as the starting point for your Week 8 assignment</a:t>
-            </a:r>
-          </a:p>
-          <a:p>
-            <a:pPr marL="0" indent="0">
-              <a:buNone/>
+              <a:t>Test </a:t>
+            </a:r>
+            <a:r>
+              <a:rPr lang="en-US" sz="2000" dirty="0" err="1"/>
+              <a:t>ShapeDrawDataClient</a:t>
+            </a:r>
+            <a:r>
+              <a:rPr lang="en-US" sz="2000" dirty="0"/>
+              <a:t> and Server together</a:t>
+            </a:r>
+          </a:p>
+          <a:p>
+            <a:pPr marL="457200" indent="-457200">
+              <a:buFont typeface="+mj-lt"/>
+              <a:buAutoNum type="arabicPeriod"/>
             </a:pPr>
-            <a:endParaRPr lang="en-US" sz="2000" dirty="0"/>
+            <a:r>
+              <a:rPr lang="en-US" sz="2000" dirty="0"/>
+              <a:t>Next Steps</a:t>
+            </a:r>
           </a:p>
         </p:txBody>
       </p:sp>
@@ -23165,6 +23446,1123 @@
 </file>
 
 <file path=ppt/slides/slide43.xml><?xml version="1.0" encoding="utf-8"?>
+<p:sld xmlns:a="http://schemas.openxmlformats.org/drawingml/2006/main" xmlns:r="http://schemas.openxmlformats.org/officeDocument/2006/relationships" xmlns:p="http://schemas.openxmlformats.org/presentationml/2006/main">
+  <p:cSld>
+    <p:spTree>
+      <p:nvGrpSpPr>
+        <p:cNvPr id="1" name=""/>
+        <p:cNvGrpSpPr/>
+        <p:nvPr/>
+      </p:nvGrpSpPr>
+      <p:grpSpPr>
+        <a:xfrm>
+          <a:off x="0" y="0"/>
+          <a:ext cx="0" cy="0"/>
+          <a:chOff x="0" y="0"/>
+          <a:chExt cx="0" cy="0"/>
+        </a:xfrm>
+      </p:grpSpPr>
+      <p:sp>
+        <p:nvSpPr>
+          <p:cNvPr id="2" name="Title 1"/>
+          <p:cNvSpPr>
+            <a:spLocks noGrp="1"/>
+          </p:cNvSpPr>
+          <p:nvPr>
+            <p:ph type="title"/>
+          </p:nvPr>
+        </p:nvSpPr>
+        <p:spPr>
+          <a:xfrm>
+            <a:off x="838200" y="474626"/>
+            <a:ext cx="10515600" cy="757272"/>
+          </a:xfrm>
+        </p:spPr>
+        <p:txBody>
+          <a:bodyPr>
+            <a:normAutofit/>
+          </a:bodyPr>
+          <a:lstStyle/>
+          <a:p>
+            <a:r>
+              <a:rPr lang="en-US" sz="3600" dirty="0"/>
+              <a:t>Learning Objectives – Week 8</a:t>
+            </a:r>
+            <a:endParaRPr lang="en-US" sz="3600" b="1" i="1" u="sng" dirty="0"/>
+          </a:p>
+        </p:txBody>
+      </p:sp>
+      <p:sp>
+        <p:nvSpPr>
+          <p:cNvPr id="3" name="Content Placeholder 2"/>
+          <p:cNvSpPr>
+            <a:spLocks noGrp="1"/>
+          </p:cNvSpPr>
+          <p:nvPr>
+            <p:ph idx="1"/>
+          </p:nvPr>
+        </p:nvSpPr>
+        <p:spPr>
+          <a:xfrm>
+            <a:off x="838200" y="1231898"/>
+            <a:ext cx="10718950" cy="5463343"/>
+          </a:xfrm>
+        </p:spPr>
+        <p:txBody>
+          <a:bodyPr>
+            <a:normAutofit/>
+          </a:bodyPr>
+          <a:lstStyle/>
+          <a:p>
+            <a:pPr marL="457200" indent="-457200">
+              <a:buFont typeface="+mj-lt"/>
+              <a:buAutoNum type="arabicPeriod"/>
+            </a:pPr>
+            <a:r>
+              <a:rPr lang="en-US" sz="2000" dirty="0"/>
+              <a:t>Describe what a thread is and why it can be useful to distribute tasks among multiple threads</a:t>
+            </a:r>
+          </a:p>
+          <a:p>
+            <a:pPr marL="457200" indent="-457200">
+              <a:buFont typeface="+mj-lt"/>
+              <a:buAutoNum type="arabicPeriod"/>
+            </a:pPr>
+            <a:r>
+              <a:rPr lang="en-US" sz="2000" dirty="0"/>
+              <a:t>Review our multi-threaded application development activities</a:t>
+            </a:r>
+          </a:p>
+          <a:p>
+            <a:pPr marL="457200" indent="-457200">
+              <a:buFont typeface="+mj-lt"/>
+              <a:buAutoNum type="arabicPeriod"/>
+            </a:pPr>
+            <a:r>
+              <a:rPr lang="en-US" sz="2000" dirty="0"/>
+              <a:t>Explain why it is important to synchronize threads that need to share data source access</a:t>
+            </a:r>
+          </a:p>
+          <a:p>
+            <a:pPr marL="457200" indent="-457200">
+              <a:buFont typeface="+mj-lt"/>
+              <a:buAutoNum type="arabicPeriod"/>
+            </a:pPr>
+            <a:r>
+              <a:rPr lang="en-US" sz="2000" dirty="0"/>
+              <a:t>Review Object Oriented Programming benefits including the associating Data &amp; Functionality, Encapsulation &amp; Information Hiding, Inheritance, and Polymorphism</a:t>
+            </a:r>
+          </a:p>
+          <a:p>
+            <a:pPr marL="457200" indent="-457200">
+              <a:buFont typeface="+mj-lt"/>
+              <a:buAutoNum type="arabicPeriod"/>
+            </a:pPr>
+            <a:r>
+              <a:rPr lang="en-US" sz="2000" dirty="0"/>
+              <a:t>Review databases, database servers, and the SQL language</a:t>
+            </a:r>
+          </a:p>
+          <a:p>
+            <a:pPr marL="457200" indent="-457200">
+              <a:buFont typeface="+mj-lt"/>
+              <a:buAutoNum type="arabicPeriod"/>
+            </a:pPr>
+            <a:r>
+              <a:rPr lang="en-US" sz="2000" dirty="0"/>
+              <a:t>Understand how databases support (or don’t support)work within a Object Oriented Programming environment</a:t>
+            </a:r>
+          </a:p>
+          <a:p>
+            <a:pPr marL="457200" indent="-457200">
+              <a:buFont typeface="+mj-lt"/>
+              <a:buAutoNum type="arabicPeriod"/>
+            </a:pPr>
+            <a:r>
+              <a:rPr lang="en-US" sz="2000" dirty="0"/>
+              <a:t>Understand client-server (two-tier), three-tier, and n-tier architectures</a:t>
+            </a:r>
+          </a:p>
+          <a:p>
+            <a:pPr marL="457200" indent="-457200">
+              <a:buFont typeface="+mj-lt"/>
+              <a:buAutoNum type="arabicPeriod"/>
+            </a:pPr>
+            <a:r>
+              <a:rPr lang="en-US" sz="2000" dirty="0"/>
+              <a:t>Introduce network programming concepts </a:t>
+            </a:r>
+          </a:p>
+          <a:p>
+            <a:pPr marL="457200" indent="-457200">
+              <a:buFont typeface="+mj-lt"/>
+              <a:buAutoNum type="arabicPeriod"/>
+            </a:pPr>
+            <a:r>
+              <a:rPr lang="en-US" sz="2000" dirty="0"/>
+              <a:t>Understand Web Services network programming</a:t>
+            </a:r>
+          </a:p>
+          <a:p>
+            <a:pPr marL="457200" indent="-457200">
+              <a:buFont typeface="+mj-lt"/>
+              <a:buAutoNum type="arabicPeriod"/>
+            </a:pPr>
+            <a:r>
+              <a:rPr lang="en-US" sz="2000" dirty="0"/>
+              <a:t>Develop a middle-tier data server using network programming</a:t>
+            </a:r>
+          </a:p>
+        </p:txBody>
+      </p:sp>
+    </p:spTree>
+    <p:extLst>
+      <p:ext uri="{BB962C8B-B14F-4D97-AF65-F5344CB8AC3E}">
+        <p14:creationId xmlns:p14="http://schemas.microsoft.com/office/powerpoint/2010/main" val="1601080309"/>
+      </p:ext>
+    </p:extLst>
+  </p:cSld>
+  <p:clrMapOvr>
+    <a:masterClrMapping/>
+  </p:clrMapOvr>
+</p:sld>
+</file>
+
+<file path=ppt/slides/slide44.xml><?xml version="1.0" encoding="utf-8"?>
+<p:sld xmlns:a="http://schemas.openxmlformats.org/drawingml/2006/main" xmlns:r="http://schemas.openxmlformats.org/officeDocument/2006/relationships" xmlns:p="http://schemas.openxmlformats.org/presentationml/2006/main">
+  <p:cSld>
+    <p:spTree>
+      <p:nvGrpSpPr>
+        <p:cNvPr id="1" name=""/>
+        <p:cNvGrpSpPr/>
+        <p:nvPr/>
+      </p:nvGrpSpPr>
+      <p:grpSpPr>
+        <a:xfrm>
+          <a:off x="0" y="0"/>
+          <a:ext cx="0" cy="0"/>
+          <a:chOff x="0" y="0"/>
+          <a:chExt cx="0" cy="0"/>
+        </a:xfrm>
+      </p:grpSpPr>
+      <p:sp>
+        <p:nvSpPr>
+          <p:cNvPr id="2" name="Title 1"/>
+          <p:cNvSpPr>
+            <a:spLocks noGrp="1"/>
+          </p:cNvSpPr>
+          <p:nvPr>
+            <p:ph type="title"/>
+          </p:nvPr>
+        </p:nvSpPr>
+        <p:spPr>
+          <a:xfrm>
+            <a:off x="838200" y="365126"/>
+            <a:ext cx="10515600" cy="757272"/>
+          </a:xfrm>
+        </p:spPr>
+        <p:txBody>
+          <a:bodyPr>
+            <a:normAutofit/>
+          </a:bodyPr>
+          <a:lstStyle/>
+          <a:p>
+            <a:r>
+              <a:rPr lang="en-US" sz="3600" dirty="0" err="1"/>
+              <a:t>ShapeDrawDataServer</a:t>
+            </a:r>
+            <a:r>
+              <a:rPr lang="en-US" sz="3600" dirty="0"/>
+              <a:t> Architecture</a:t>
+            </a:r>
+          </a:p>
+        </p:txBody>
+      </p:sp>
+      <p:sp>
+        <p:nvSpPr>
+          <p:cNvPr id="18" name="Flowchart: Multidocument 17"/>
+          <p:cNvSpPr/>
+          <p:nvPr/>
+        </p:nvSpPr>
+        <p:spPr>
+          <a:xfrm>
+            <a:off x="4114801" y="2927192"/>
+            <a:ext cx="3821148" cy="941943"/>
+          </a:xfrm>
+          <a:prstGeom prst="flowChartMultidocument">
+            <a:avLst/>
+          </a:prstGeom>
+          <a:solidFill>
+            <a:schemeClr val="accent6">
+              <a:lumMod val="60000"/>
+              <a:lumOff val="40000"/>
+            </a:schemeClr>
+          </a:solidFill>
+        </p:spPr>
+        <p:style>
+          <a:lnRef idx="2">
+            <a:schemeClr val="accent1">
+              <a:shade val="50000"/>
+            </a:schemeClr>
+          </a:lnRef>
+          <a:fillRef idx="1">
+            <a:schemeClr val="accent1"/>
+          </a:fillRef>
+          <a:effectRef idx="0">
+            <a:schemeClr val="accent1"/>
+          </a:effectRef>
+          <a:fontRef idx="minor">
+            <a:schemeClr val="lt1"/>
+          </a:fontRef>
+        </p:style>
+        <p:txBody>
+          <a:bodyPr rtlCol="0" anchor="ctr"/>
+          <a:lstStyle/>
+          <a:p>
+            <a:pPr algn="ctr"/>
+            <a:r>
+              <a:rPr lang="en-US" dirty="0" err="1"/>
+              <a:t>ShapeDrawDataServer</a:t>
+            </a:r>
+            <a:r>
+              <a:rPr lang="en-US" dirty="0"/>
+              <a:t> (APIs)</a:t>
+            </a:r>
+          </a:p>
+        </p:txBody>
+      </p:sp>
+      <p:sp>
+        <p:nvSpPr>
+          <p:cNvPr id="19" name="Flowchart: Process 18"/>
+          <p:cNvSpPr/>
+          <p:nvPr/>
+        </p:nvSpPr>
+        <p:spPr>
+          <a:xfrm>
+            <a:off x="5205760" y="1467454"/>
+            <a:ext cx="1628078" cy="691375"/>
+          </a:xfrm>
+          <a:prstGeom prst="flowChartProcess">
+            <a:avLst/>
+          </a:prstGeom>
+        </p:spPr>
+        <p:style>
+          <a:lnRef idx="2">
+            <a:schemeClr val="accent1">
+              <a:shade val="50000"/>
+            </a:schemeClr>
+          </a:lnRef>
+          <a:fillRef idx="1">
+            <a:schemeClr val="accent1"/>
+          </a:fillRef>
+          <a:effectRef idx="0">
+            <a:schemeClr val="accent1"/>
+          </a:effectRef>
+          <a:fontRef idx="minor">
+            <a:schemeClr val="lt1"/>
+          </a:fontRef>
+        </p:style>
+        <p:txBody>
+          <a:bodyPr rtlCol="0" anchor="ctr"/>
+          <a:lstStyle/>
+          <a:p>
+            <a:pPr algn="ctr"/>
+            <a:r>
+              <a:rPr lang="en-US" dirty="0" err="1"/>
+              <a:t>ShapeDraw</a:t>
+            </a:r>
+            <a:endParaRPr lang="en-US" dirty="0"/>
+          </a:p>
+        </p:txBody>
+      </p:sp>
+      <p:sp>
+        <p:nvSpPr>
+          <p:cNvPr id="20" name="Flowchart: Magnetic Disk 19"/>
+          <p:cNvSpPr/>
+          <p:nvPr/>
+        </p:nvSpPr>
+        <p:spPr>
+          <a:xfrm>
+            <a:off x="4029308" y="4777367"/>
+            <a:ext cx="1761892" cy="529683"/>
+          </a:xfrm>
+          <a:prstGeom prst="flowChartMagneticDisk">
+            <a:avLst/>
+          </a:prstGeom>
+        </p:spPr>
+        <p:style>
+          <a:lnRef idx="2">
+            <a:schemeClr val="accent1">
+              <a:shade val="50000"/>
+            </a:schemeClr>
+          </a:lnRef>
+          <a:fillRef idx="1">
+            <a:schemeClr val="accent1"/>
+          </a:fillRef>
+          <a:effectRef idx="0">
+            <a:schemeClr val="accent1"/>
+          </a:effectRef>
+          <a:fontRef idx="minor">
+            <a:schemeClr val="lt1"/>
+          </a:fontRef>
+        </p:style>
+        <p:txBody>
+          <a:bodyPr rtlCol="0" anchor="ctr"/>
+          <a:lstStyle/>
+          <a:p>
+            <a:pPr algn="ctr"/>
+            <a:r>
+              <a:rPr lang="en-US" dirty="0" err="1"/>
+              <a:t>ShapesXML</a:t>
+            </a:r>
+            <a:endParaRPr lang="en-US" dirty="0"/>
+          </a:p>
+        </p:txBody>
+      </p:sp>
+      <p:sp>
+        <p:nvSpPr>
+          <p:cNvPr id="21" name="Flowchart: Magnetic Disk 20"/>
+          <p:cNvSpPr/>
+          <p:nvPr/>
+        </p:nvSpPr>
+        <p:spPr>
+          <a:xfrm>
+            <a:off x="6272562" y="4777367"/>
+            <a:ext cx="1761892" cy="529683"/>
+          </a:xfrm>
+          <a:prstGeom prst="flowChartMagneticDisk">
+            <a:avLst/>
+          </a:prstGeom>
+        </p:spPr>
+        <p:style>
+          <a:lnRef idx="2">
+            <a:schemeClr val="accent1">
+              <a:shade val="50000"/>
+            </a:schemeClr>
+          </a:lnRef>
+          <a:fillRef idx="1">
+            <a:schemeClr val="accent1"/>
+          </a:fillRef>
+          <a:effectRef idx="0">
+            <a:schemeClr val="accent1"/>
+          </a:effectRef>
+          <a:fontRef idx="minor">
+            <a:schemeClr val="lt1"/>
+          </a:fontRef>
+        </p:style>
+        <p:txBody>
+          <a:bodyPr rtlCol="0" anchor="ctr"/>
+          <a:lstStyle/>
+          <a:p>
+            <a:pPr algn="ctr"/>
+            <a:r>
+              <a:rPr lang="en-US" dirty="0" err="1"/>
+              <a:t>ShapeColorsXML</a:t>
+            </a:r>
+            <a:endParaRPr lang="en-US" dirty="0"/>
+          </a:p>
+        </p:txBody>
+      </p:sp>
+      <p:cxnSp>
+        <p:nvCxnSpPr>
+          <p:cNvPr id="28" name="Straight Arrow Connector 27"/>
+          <p:cNvCxnSpPr>
+            <a:cxnSpLocks/>
+            <a:endCxn id="21" idx="1"/>
+          </p:cNvCxnSpPr>
+          <p:nvPr/>
+        </p:nvCxnSpPr>
+        <p:spPr>
+          <a:xfrm>
+            <a:off x="6019799" y="3819124"/>
+            <a:ext cx="1133709" cy="958243"/>
+          </a:xfrm>
+          <a:prstGeom prst="straightConnector1">
+            <a:avLst/>
+          </a:prstGeom>
+          <a:ln w="25400">
+            <a:solidFill>
+              <a:schemeClr val="tx1"/>
+            </a:solidFill>
+            <a:tailEnd type="triangle"/>
+          </a:ln>
+        </p:spPr>
+        <p:style>
+          <a:lnRef idx="1">
+            <a:schemeClr val="accent1"/>
+          </a:lnRef>
+          <a:fillRef idx="0">
+            <a:schemeClr val="accent1"/>
+          </a:fillRef>
+          <a:effectRef idx="0">
+            <a:schemeClr val="accent1"/>
+          </a:effectRef>
+          <a:fontRef idx="minor">
+            <a:schemeClr val="tx1"/>
+          </a:fontRef>
+        </p:style>
+      </p:cxnSp>
+      <p:cxnSp>
+        <p:nvCxnSpPr>
+          <p:cNvPr id="29" name="Straight Arrow Connector 28"/>
+          <p:cNvCxnSpPr>
+            <a:cxnSpLocks/>
+            <a:stCxn id="18" idx="2"/>
+            <a:endCxn id="20" idx="1"/>
+          </p:cNvCxnSpPr>
+          <p:nvPr/>
+        </p:nvCxnSpPr>
+        <p:spPr>
+          <a:xfrm flipH="1">
+            <a:off x="4910254" y="3833463"/>
+            <a:ext cx="849410" cy="943904"/>
+          </a:xfrm>
+          <a:prstGeom prst="straightConnector1">
+            <a:avLst/>
+          </a:prstGeom>
+          <a:ln w="25400">
+            <a:solidFill>
+              <a:schemeClr val="tx1"/>
+            </a:solidFill>
+            <a:tailEnd type="triangle"/>
+          </a:ln>
+        </p:spPr>
+        <p:style>
+          <a:lnRef idx="1">
+            <a:schemeClr val="accent1"/>
+          </a:lnRef>
+          <a:fillRef idx="0">
+            <a:schemeClr val="accent1"/>
+          </a:fillRef>
+          <a:effectRef idx="0">
+            <a:schemeClr val="accent1"/>
+          </a:effectRef>
+          <a:fontRef idx="minor">
+            <a:schemeClr val="tx1"/>
+          </a:fontRef>
+        </p:style>
+      </p:cxnSp>
+      <p:cxnSp>
+        <p:nvCxnSpPr>
+          <p:cNvPr id="36" name="Straight Arrow Connector 35"/>
+          <p:cNvCxnSpPr>
+            <a:cxnSpLocks/>
+            <a:stCxn id="19" idx="2"/>
+          </p:cNvCxnSpPr>
+          <p:nvPr/>
+        </p:nvCxnSpPr>
+        <p:spPr>
+          <a:xfrm>
+            <a:off x="6019799" y="2158829"/>
+            <a:ext cx="0" cy="768363"/>
+          </a:xfrm>
+          <a:prstGeom prst="straightConnector1">
+            <a:avLst/>
+          </a:prstGeom>
+          <a:ln w="25400">
+            <a:solidFill>
+              <a:schemeClr val="tx1"/>
+            </a:solidFill>
+            <a:tailEnd type="triangle"/>
+          </a:ln>
+        </p:spPr>
+        <p:style>
+          <a:lnRef idx="1">
+            <a:schemeClr val="accent1"/>
+          </a:lnRef>
+          <a:fillRef idx="0">
+            <a:schemeClr val="accent1"/>
+          </a:fillRef>
+          <a:effectRef idx="0">
+            <a:schemeClr val="accent1"/>
+          </a:effectRef>
+          <a:fontRef idx="minor">
+            <a:schemeClr val="tx1"/>
+          </a:fontRef>
+        </p:style>
+      </p:cxnSp>
+      <p:sp>
+        <p:nvSpPr>
+          <p:cNvPr id="16" name="Rectangle 15"/>
+          <p:cNvSpPr/>
+          <p:nvPr/>
+        </p:nvSpPr>
+        <p:spPr>
+          <a:xfrm>
+            <a:off x="7827301" y="3819124"/>
+            <a:ext cx="3484608" cy="369332"/>
+          </a:xfrm>
+          <a:prstGeom prst="rect">
+            <a:avLst/>
+          </a:prstGeom>
+        </p:spPr>
+        <p:txBody>
+          <a:bodyPr wrap="none">
+            <a:spAutoFit/>
+          </a:bodyPr>
+          <a:lstStyle/>
+          <a:p>
+            <a:r>
+              <a:rPr lang="en-US" b="1" dirty="0"/>
+              <a:t>HTTP: Hypertext Transfer Protocol </a:t>
+            </a:r>
+          </a:p>
+        </p:txBody>
+      </p:sp>
+      <p:sp>
+        <p:nvSpPr>
+          <p:cNvPr id="17" name="Rectangle 16"/>
+          <p:cNvSpPr/>
+          <p:nvPr/>
+        </p:nvSpPr>
+        <p:spPr>
+          <a:xfrm>
+            <a:off x="7846024" y="4188153"/>
+            <a:ext cx="3465885" cy="369332"/>
+          </a:xfrm>
+          <a:prstGeom prst="rect">
+            <a:avLst/>
+          </a:prstGeom>
+        </p:spPr>
+        <p:txBody>
+          <a:bodyPr wrap="none">
+            <a:spAutoFit/>
+          </a:bodyPr>
+          <a:lstStyle/>
+          <a:p>
+            <a:r>
+              <a:rPr lang="en-US" b="1" dirty="0"/>
+              <a:t>XML: Extensible Markup Language</a:t>
+            </a:r>
+          </a:p>
+        </p:txBody>
+      </p:sp>
+      <p:sp>
+        <p:nvSpPr>
+          <p:cNvPr id="23" name="Rectangle 22"/>
+          <p:cNvSpPr/>
+          <p:nvPr/>
+        </p:nvSpPr>
+        <p:spPr>
+          <a:xfrm>
+            <a:off x="6950927" y="2121352"/>
+            <a:ext cx="6096000" cy="646331"/>
+          </a:xfrm>
+          <a:prstGeom prst="rect">
+            <a:avLst/>
+          </a:prstGeom>
+        </p:spPr>
+        <p:txBody>
+          <a:bodyPr>
+            <a:spAutoFit/>
+          </a:bodyPr>
+          <a:lstStyle/>
+          <a:p>
+            <a:r>
+              <a:rPr lang="en-US" b="1" dirty="0"/>
+              <a:t>TCP/IP: Transmission Control Protocol / Internet Protocol</a:t>
+            </a:r>
+          </a:p>
+          <a:p>
+            <a:r>
+              <a:rPr lang="en-US" b="1" dirty="0"/>
+              <a:t>Sockets: Another term for TCP/IP </a:t>
+            </a:r>
+          </a:p>
+        </p:txBody>
+      </p:sp>
+      <p:sp>
+        <p:nvSpPr>
+          <p:cNvPr id="13" name="Flowchart: Process 12"/>
+          <p:cNvSpPr/>
+          <p:nvPr/>
+        </p:nvSpPr>
+        <p:spPr>
+          <a:xfrm>
+            <a:off x="2988437" y="1467454"/>
+            <a:ext cx="1628078" cy="691375"/>
+          </a:xfrm>
+          <a:prstGeom prst="flowChartProcess">
+            <a:avLst/>
+          </a:prstGeom>
+        </p:spPr>
+        <p:style>
+          <a:lnRef idx="2">
+            <a:schemeClr val="accent1">
+              <a:shade val="50000"/>
+            </a:schemeClr>
+          </a:lnRef>
+          <a:fillRef idx="1">
+            <a:schemeClr val="accent1"/>
+          </a:fillRef>
+          <a:effectRef idx="0">
+            <a:schemeClr val="accent1"/>
+          </a:effectRef>
+          <a:fontRef idx="minor">
+            <a:schemeClr val="lt1"/>
+          </a:fontRef>
+        </p:style>
+        <p:txBody>
+          <a:bodyPr rtlCol="0" anchor="ctr"/>
+          <a:lstStyle/>
+          <a:p>
+            <a:pPr algn="ctr"/>
+            <a:r>
+              <a:rPr lang="en-US" u="sng" dirty="0" err="1"/>
+              <a:t>ShapeDraw</a:t>
+            </a:r>
+            <a:endParaRPr lang="en-US" u="sng" dirty="0"/>
+          </a:p>
+          <a:p>
+            <a:pPr algn="ctr"/>
+            <a:r>
+              <a:rPr lang="en-US" u="sng" dirty="0" err="1"/>
+              <a:t>DataClient</a:t>
+            </a:r>
+            <a:endParaRPr lang="en-US" dirty="0"/>
+          </a:p>
+        </p:txBody>
+      </p:sp>
+      <p:cxnSp>
+        <p:nvCxnSpPr>
+          <p:cNvPr id="14" name="Straight Arrow Connector 13"/>
+          <p:cNvCxnSpPr>
+            <a:cxnSpLocks/>
+            <a:stCxn id="13" idx="2"/>
+          </p:cNvCxnSpPr>
+          <p:nvPr/>
+        </p:nvCxnSpPr>
+        <p:spPr>
+          <a:xfrm>
+            <a:off x="3802476" y="2158829"/>
+            <a:ext cx="1232040" cy="768363"/>
+          </a:xfrm>
+          <a:prstGeom prst="straightConnector1">
+            <a:avLst/>
+          </a:prstGeom>
+          <a:ln w="25400">
+            <a:solidFill>
+              <a:schemeClr val="tx1"/>
+            </a:solidFill>
+            <a:tailEnd type="triangle"/>
+          </a:ln>
+        </p:spPr>
+        <p:style>
+          <a:lnRef idx="1">
+            <a:schemeClr val="accent1"/>
+          </a:lnRef>
+          <a:fillRef idx="0">
+            <a:schemeClr val="accent1"/>
+          </a:fillRef>
+          <a:effectRef idx="0">
+            <a:schemeClr val="accent1"/>
+          </a:effectRef>
+          <a:fontRef idx="minor">
+            <a:schemeClr val="tx1"/>
+          </a:fontRef>
+        </p:style>
+      </p:cxnSp>
+    </p:spTree>
+    <p:extLst>
+      <p:ext uri="{BB962C8B-B14F-4D97-AF65-F5344CB8AC3E}">
+        <p14:creationId xmlns:p14="http://schemas.microsoft.com/office/powerpoint/2010/main" val="3643387773"/>
+      </p:ext>
+    </p:extLst>
+  </p:cSld>
+  <p:clrMapOvr>
+    <a:masterClrMapping/>
+  </p:clrMapOvr>
+  <p:timing>
+    <p:tnLst>
+      <p:par>
+        <p:cTn id="1" dur="indefinite" restart="never" nodeType="tmRoot">
+          <p:childTnLst>
+            <p:seq concurrent="1" nextAc="seek">
+              <p:cTn id="2" dur="indefinite" nodeType="mainSeq">
+                <p:childTnLst>
+                  <p:par>
+                    <p:cTn id="3" fill="hold">
+                      <p:stCondLst>
+                        <p:cond delay="indefinite"/>
+                      </p:stCondLst>
+                      <p:childTnLst>
+                        <p:par>
+                          <p:cTn id="4" fill="hold">
+                            <p:stCondLst>
+                              <p:cond delay="0"/>
+                            </p:stCondLst>
+                            <p:childTnLst>
+                              <p:par>
+                                <p:cTn id="5" presetID="2" presetClass="entr" presetSubtype="4" fill="hold" nodeType="clickEffect">
+                                  <p:stCondLst>
+                                    <p:cond delay="0"/>
+                                  </p:stCondLst>
+                                  <p:childTnLst>
+                                    <p:set>
+                                      <p:cBhvr>
+                                        <p:cTn id="6" dur="1" fill="hold">
+                                          <p:stCondLst>
+                                            <p:cond delay="0"/>
+                                          </p:stCondLst>
+                                        </p:cTn>
+                                        <p:tgtEl>
+                                          <p:spTgt spid="14"/>
+                                        </p:tgtEl>
+                                        <p:attrNameLst>
+                                          <p:attrName>style.visibility</p:attrName>
+                                        </p:attrNameLst>
+                                      </p:cBhvr>
+                                      <p:to>
+                                        <p:strVal val="visible"/>
+                                      </p:to>
+                                    </p:set>
+                                    <p:anim calcmode="lin" valueType="num">
+                                      <p:cBhvr additive="base">
+                                        <p:cTn id="7" dur="500" fill="hold"/>
+                                        <p:tgtEl>
+                                          <p:spTgt spid="14"/>
+                                        </p:tgtEl>
+                                        <p:attrNameLst>
+                                          <p:attrName>ppt_x</p:attrName>
+                                        </p:attrNameLst>
+                                      </p:cBhvr>
+                                      <p:tavLst>
+                                        <p:tav tm="0">
+                                          <p:val>
+                                            <p:strVal val="#ppt_x"/>
+                                          </p:val>
+                                        </p:tav>
+                                        <p:tav tm="100000">
+                                          <p:val>
+                                            <p:strVal val="#ppt_x"/>
+                                          </p:val>
+                                        </p:tav>
+                                      </p:tavLst>
+                                    </p:anim>
+                                    <p:anim calcmode="lin" valueType="num">
+                                      <p:cBhvr additive="base">
+                                        <p:cTn id="8" dur="500" fill="hold"/>
+                                        <p:tgtEl>
+                                          <p:spTgt spid="14"/>
+                                        </p:tgtEl>
+                                        <p:attrNameLst>
+                                          <p:attrName>ppt_y</p:attrName>
+                                        </p:attrNameLst>
+                                      </p:cBhvr>
+                                      <p:tavLst>
+                                        <p:tav tm="0">
+                                          <p:val>
+                                            <p:strVal val="1+#ppt_h/2"/>
+                                          </p:val>
+                                        </p:tav>
+                                        <p:tav tm="100000">
+                                          <p:val>
+                                            <p:strVal val="#ppt_y"/>
+                                          </p:val>
+                                        </p:tav>
+                                      </p:tavLst>
+                                    </p:anim>
+                                  </p:childTnLst>
+                                </p:cTn>
+                              </p:par>
+                              <p:par>
+                                <p:cTn id="9" presetID="2" presetClass="entr" presetSubtype="4" fill="hold" grpId="0" nodeType="withEffect">
+                                  <p:stCondLst>
+                                    <p:cond delay="0"/>
+                                  </p:stCondLst>
+                                  <p:childTnLst>
+                                    <p:set>
+                                      <p:cBhvr>
+                                        <p:cTn id="10" dur="1" fill="hold">
+                                          <p:stCondLst>
+                                            <p:cond delay="0"/>
+                                          </p:stCondLst>
+                                        </p:cTn>
+                                        <p:tgtEl>
+                                          <p:spTgt spid="13"/>
+                                        </p:tgtEl>
+                                        <p:attrNameLst>
+                                          <p:attrName>style.visibility</p:attrName>
+                                        </p:attrNameLst>
+                                      </p:cBhvr>
+                                      <p:to>
+                                        <p:strVal val="visible"/>
+                                      </p:to>
+                                    </p:set>
+                                    <p:anim calcmode="lin" valueType="num">
+                                      <p:cBhvr additive="base">
+                                        <p:cTn id="11" dur="500" fill="hold"/>
+                                        <p:tgtEl>
+                                          <p:spTgt spid="13"/>
+                                        </p:tgtEl>
+                                        <p:attrNameLst>
+                                          <p:attrName>ppt_x</p:attrName>
+                                        </p:attrNameLst>
+                                      </p:cBhvr>
+                                      <p:tavLst>
+                                        <p:tav tm="0">
+                                          <p:val>
+                                            <p:strVal val="#ppt_x"/>
+                                          </p:val>
+                                        </p:tav>
+                                        <p:tav tm="100000">
+                                          <p:val>
+                                            <p:strVal val="#ppt_x"/>
+                                          </p:val>
+                                        </p:tav>
+                                      </p:tavLst>
+                                    </p:anim>
+                                    <p:anim calcmode="lin" valueType="num">
+                                      <p:cBhvr additive="base">
+                                        <p:cTn id="12" dur="500" fill="hold"/>
+                                        <p:tgtEl>
+                                          <p:spTgt spid="13"/>
+                                        </p:tgtEl>
+                                        <p:attrNameLst>
+                                          <p:attrName>ppt_y</p:attrName>
+                                        </p:attrNameLst>
+                                      </p:cBhvr>
+                                      <p:tavLst>
+                                        <p:tav tm="0">
+                                          <p:val>
+                                            <p:strVal val="1+#ppt_h/2"/>
+                                          </p:val>
+                                        </p:tav>
+                                        <p:tav tm="100000">
+                                          <p:val>
+                                            <p:strVal val="#ppt_y"/>
+                                          </p:val>
+                                        </p:tav>
+                                      </p:tavLst>
+                                    </p:anim>
+                                  </p:childTnLst>
+                                </p:cTn>
+                              </p:par>
+                            </p:childTnLst>
+                          </p:cTn>
+                        </p:par>
+                      </p:childTnLst>
+                    </p:cTn>
+                  </p:par>
+                </p:childTnLst>
+              </p:cTn>
+              <p:prevCondLst>
+                <p:cond evt="onPrev" delay="0">
+                  <p:tgtEl>
+                    <p:sldTgt/>
+                  </p:tgtEl>
+                </p:cond>
+              </p:prevCondLst>
+              <p:nextCondLst>
+                <p:cond evt="onNext" delay="0">
+                  <p:tgtEl>
+                    <p:sldTgt/>
+                  </p:tgtEl>
+                </p:cond>
+              </p:nextCondLst>
+            </p:seq>
+          </p:childTnLst>
+        </p:cTn>
+      </p:par>
+    </p:tnLst>
+    <p:bldLst>
+      <p:bldP spid="13" grpId="0" animBg="1"/>
+    </p:bldLst>
+  </p:timing>
+</p:sld>
+</file>
+
+<file path=ppt/slides/slide45.xml><?xml version="1.0" encoding="utf-8"?>
+<p:sld xmlns:a="http://schemas.openxmlformats.org/drawingml/2006/main" xmlns:r="http://schemas.openxmlformats.org/officeDocument/2006/relationships" xmlns:p="http://schemas.openxmlformats.org/presentationml/2006/main">
+  <p:cSld>
+    <p:spTree>
+      <p:nvGrpSpPr>
+        <p:cNvPr id="1" name=""/>
+        <p:cNvGrpSpPr/>
+        <p:nvPr/>
+      </p:nvGrpSpPr>
+      <p:grpSpPr>
+        <a:xfrm>
+          <a:off x="0" y="0"/>
+          <a:ext cx="0" cy="0"/>
+          <a:chOff x="0" y="0"/>
+          <a:chExt cx="0" cy="0"/>
+        </a:xfrm>
+      </p:grpSpPr>
+      <p:sp>
+        <p:nvSpPr>
+          <p:cNvPr id="2" name="Title 1"/>
+          <p:cNvSpPr>
+            <a:spLocks noGrp="1"/>
+          </p:cNvSpPr>
+          <p:nvPr>
+            <p:ph type="title"/>
+          </p:nvPr>
+        </p:nvSpPr>
+        <p:spPr>
+          <a:xfrm>
+            <a:off x="838200" y="365126"/>
+            <a:ext cx="6113662" cy="1409174"/>
+          </a:xfrm>
+        </p:spPr>
+        <p:txBody>
+          <a:bodyPr>
+            <a:normAutofit/>
+          </a:bodyPr>
+          <a:lstStyle/>
+          <a:p>
+            <a:r>
+              <a:rPr lang="en-US" sz="3600" dirty="0"/>
+              <a:t>Object-Oriented Programming</a:t>
+            </a:r>
+            <a:br>
+              <a:rPr lang="en-US" sz="3600" dirty="0"/>
+            </a:br>
+            <a:r>
+              <a:rPr lang="en-US" sz="1800" dirty="0"/>
+              <a:t>Session: Week 8 Session 4 </a:t>
+            </a:r>
+            <a:br>
+              <a:rPr lang="en-US" sz="1800" dirty="0"/>
+            </a:br>
+            <a:r>
+              <a:rPr lang="en-US" sz="1800" dirty="0"/>
+              <a:t>Instructor: Eric Pogue</a:t>
+            </a:r>
+            <a:endParaRPr lang="en-US" sz="1800" b="1" i="1" u="sng" dirty="0"/>
+          </a:p>
+        </p:txBody>
+      </p:sp>
+      <p:pic>
+        <p:nvPicPr>
+          <p:cNvPr id="4" name="Content Placeholder 4"/>
+          <p:cNvPicPr>
+            <a:picLocks noChangeAspect="1"/>
+          </p:cNvPicPr>
+          <p:nvPr/>
+        </p:nvPicPr>
+        <p:blipFill>
+          <a:blip r:embed="rId3"/>
+          <a:stretch>
+            <a:fillRect/>
+          </a:stretch>
+        </p:blipFill>
+        <p:spPr>
+          <a:xfrm>
+            <a:off x="9072894" y="182925"/>
+            <a:ext cx="2656367" cy="1366321"/>
+          </a:xfrm>
+          <a:prstGeom prst="rect">
+            <a:avLst/>
+          </a:prstGeom>
+        </p:spPr>
+      </p:pic>
+      <p:sp>
+        <p:nvSpPr>
+          <p:cNvPr id="10" name="Content Placeholder 2"/>
+          <p:cNvSpPr>
+            <a:spLocks noGrp="1"/>
+          </p:cNvSpPr>
+          <p:nvPr>
+            <p:ph idx="1"/>
+          </p:nvPr>
+        </p:nvSpPr>
+        <p:spPr>
+          <a:xfrm>
+            <a:off x="838200" y="1884313"/>
+            <a:ext cx="10718950" cy="4571242"/>
+          </a:xfrm>
+        </p:spPr>
+        <p:txBody>
+          <a:bodyPr>
+            <a:noAutofit/>
+          </a:bodyPr>
+          <a:lstStyle/>
+          <a:p>
+            <a:pPr marL="0" indent="0">
+              <a:buNone/>
+            </a:pPr>
+            <a:r>
+              <a:rPr lang="en-US" sz="2000" u="sng" dirty="0" err="1"/>
+              <a:t>ShapeDrawDataServerStart</a:t>
+            </a:r>
+            <a:r>
+              <a:rPr lang="en-US" sz="2000" u="sng" dirty="0"/>
+              <a:t> Application:</a:t>
+            </a:r>
+          </a:p>
+          <a:p>
+            <a:pPr marL="457200" indent="-457200">
+              <a:buFont typeface="+mj-lt"/>
+              <a:buAutoNum type="arabicPeriod"/>
+            </a:pPr>
+            <a:r>
+              <a:rPr lang="en-US" sz="2000" dirty="0"/>
+              <a:t>Develop application entirely in Visual Studio 2017 and C#</a:t>
+            </a:r>
+          </a:p>
+          <a:p>
+            <a:pPr marL="457200" indent="-457200">
+              <a:buFont typeface="+mj-lt"/>
+              <a:buAutoNum type="arabicPeriod"/>
+            </a:pPr>
+            <a:r>
+              <a:rPr lang="en-US" sz="2000" dirty="0"/>
+              <a:t>Listen for a socket request</a:t>
+            </a:r>
+          </a:p>
+          <a:p>
+            <a:pPr marL="457200" indent="-457200">
+              <a:buFont typeface="+mj-lt"/>
+              <a:buAutoNum type="arabicPeriod"/>
+            </a:pPr>
+            <a:r>
+              <a:rPr lang="en-US" sz="2000" dirty="0"/>
+              <a:t>Test Server and Client together</a:t>
+            </a:r>
+          </a:p>
+          <a:p>
+            <a:pPr marL="457200" indent="-457200">
+              <a:buFont typeface="+mj-lt"/>
+              <a:buAutoNum type="arabicPeriod"/>
+            </a:pPr>
+            <a:r>
+              <a:rPr lang="en-US" sz="2000" dirty="0"/>
+              <a:t>Reiterate that you may utilize this code as the starting point for your Week 8 assignment</a:t>
+            </a:r>
+          </a:p>
+          <a:p>
+            <a:pPr marL="457200" indent="-457200">
+              <a:buFont typeface="+mj-lt"/>
+              <a:buAutoNum type="arabicPeriod"/>
+            </a:pPr>
+            <a:r>
+              <a:rPr lang="en-US" sz="2000" dirty="0"/>
+              <a:t>Next Steps</a:t>
+            </a:r>
+          </a:p>
+          <a:p>
+            <a:pPr marL="0" indent="0">
+              <a:buNone/>
+            </a:pPr>
+            <a:endParaRPr lang="en-US" sz="2000" dirty="0"/>
+          </a:p>
+        </p:txBody>
+      </p:sp>
+    </p:spTree>
+    <p:extLst>
+      <p:ext uri="{BB962C8B-B14F-4D97-AF65-F5344CB8AC3E}">
+        <p14:creationId xmlns:p14="http://schemas.microsoft.com/office/powerpoint/2010/main" val="3729853180"/>
+      </p:ext>
+    </p:extLst>
+  </p:cSld>
+  <p:clrMapOvr>
+    <a:masterClrMapping/>
+  </p:clrMapOvr>
+</p:sld>
+</file>
+
+<file path=ppt/slides/slide46.xml><?xml version="1.0" encoding="utf-8"?>
 <p:sld xmlns:a="http://schemas.openxmlformats.org/drawingml/2006/main" xmlns:r="http://schemas.openxmlformats.org/officeDocument/2006/relationships" xmlns:p="http://schemas.openxmlformats.org/presentationml/2006/main">
   <p:cSld>
     <p:bg>
@@ -23284,7 +24682,7 @@
 </p:sld>
 </file>
 
-<file path=ppt/slides/slide44.xml><?xml version="1.0" encoding="utf-8"?>
+<file path=ppt/slides/slide47.xml><?xml version="1.0" encoding="utf-8"?>
 <p:sld xmlns:a="http://schemas.openxmlformats.org/drawingml/2006/main" xmlns:r="http://schemas.openxmlformats.org/officeDocument/2006/relationships" xmlns:p="http://schemas.openxmlformats.org/presentationml/2006/main">
   <p:cSld>
     <p:bg>
@@ -24619,12 +26017,9 @@
 </file>
 
 <file path=customXml/item1.xml><?xml version="1.0" encoding="utf-8"?>
-<?mso-contentType ?>
-<FormTemplates xmlns="http://schemas.microsoft.com/sharepoint/v3/contenttype/forms">
-  <Display>DocumentLibraryForm</Display>
-  <Edit>DocumentLibraryForm</Edit>
-  <New>DocumentLibraryForm</New>
-</FormTemplates>
+<p:properties xmlns:p="http://schemas.microsoft.com/office/2006/metadata/properties" xmlns:xsi="http://www.w3.org/2001/XMLSchema-instance" xmlns:pc="http://schemas.microsoft.com/office/infopath/2007/PartnerControls">
+  <documentManagement/>
+</p:properties>
 </file>
 
 <file path=customXml/item2.xml><?xml version="1.0" encoding="utf-8"?>
@@ -24742,15 +26137,25 @@
 </file>
 
 <file path=customXml/item3.xml><?xml version="1.0" encoding="utf-8"?>
-<p:properties xmlns:p="http://schemas.microsoft.com/office/2006/metadata/properties" xmlns:xsi="http://www.w3.org/2001/XMLSchema-instance" xmlns:pc="http://schemas.microsoft.com/office/infopath/2007/PartnerControls">
-  <documentManagement/>
-</p:properties>
+<?mso-contentType ?>
+<FormTemplates xmlns="http://schemas.microsoft.com/sharepoint/v3/contenttype/forms">
+  <Display>DocumentLibraryForm</Display>
+  <Edit>DocumentLibraryForm</Edit>
+  <New>DocumentLibraryForm</New>
+</FormTemplates>
 </file>
 
 <file path=customXml/itemProps1.xml><?xml version="1.0" encoding="utf-8"?>
-<ds:datastoreItem xmlns:ds="http://schemas.openxmlformats.org/officeDocument/2006/customXml" ds:itemID="{87FD8B20-B89A-4B23-9329-175195DD4D8A}">
+<ds:datastoreItem xmlns:ds="http://schemas.openxmlformats.org/officeDocument/2006/customXml" ds:itemID="{3473EA1A-2744-48E8-B2A3-4F89C0FC849C}">
   <ds:schemaRefs>
-    <ds:schemaRef ds:uri="http://schemas.microsoft.com/sharepoint/v3/contenttype/forms"/>
+    <ds:schemaRef ds:uri="http://purl.org/dc/terms/"/>
+    <ds:schemaRef ds:uri="http://schemas.openxmlformats.org/package/2006/metadata/core-properties"/>
+    <ds:schemaRef ds:uri="http://purl.org/dc/dcmitype/"/>
+    <ds:schemaRef ds:uri="http://schemas.microsoft.com/office/infopath/2007/PartnerControls"/>
+    <ds:schemaRef ds:uri="http://purl.org/dc/elements/1.1/"/>
+    <ds:schemaRef ds:uri="http://schemas.microsoft.com/office/2006/metadata/properties"/>
+    <ds:schemaRef ds:uri="http://schemas.microsoft.com/office/2006/documentManagement/types"/>
+    <ds:schemaRef ds:uri="http://www.w3.org/XML/1998/namespace"/>
   </ds:schemaRefs>
 </ds:datastoreItem>
 </file>
@@ -24772,16 +26177,9 @@
 </file>
 
 <file path=customXml/itemProps3.xml><?xml version="1.0" encoding="utf-8"?>
-<ds:datastoreItem xmlns:ds="http://schemas.openxmlformats.org/officeDocument/2006/customXml" ds:itemID="{3473EA1A-2744-48E8-B2A3-4F89C0FC849C}">
+<ds:datastoreItem xmlns:ds="http://schemas.openxmlformats.org/officeDocument/2006/customXml" ds:itemID="{87FD8B20-B89A-4B23-9329-175195DD4D8A}">
   <ds:schemaRefs>
-    <ds:schemaRef ds:uri="http://purl.org/dc/terms/"/>
-    <ds:schemaRef ds:uri="http://schemas.microsoft.com/office/2006/documentManagement/types"/>
-    <ds:schemaRef ds:uri="http://purl.org/dc/dcmitype/"/>
-    <ds:schemaRef ds:uri="http://schemas.microsoft.com/office/infopath/2007/PartnerControls"/>
-    <ds:schemaRef ds:uri="http://purl.org/dc/elements/1.1/"/>
-    <ds:schemaRef ds:uri="http://schemas.microsoft.com/office/2006/metadata/properties"/>
-    <ds:schemaRef ds:uri="http://schemas.openxmlformats.org/package/2006/metadata/core-properties"/>
-    <ds:schemaRef ds:uri="http://www.w3.org/XML/1998/namespace"/>
+    <ds:schemaRef ds:uri="http://schemas.microsoft.com/sharepoint/v3/contenttype/forms"/>
   </ds:schemaRefs>
 </ds:datastoreItem>
 </file>
</xml_diff>